<commit_message>
second push of 2023
</commit_message>
<xml_diff>
--- a/Demos/Rbased/Presentations/04.Activity-Climate Processing.pptx
+++ b/Demos/Rbased/Presentations/04.Activity-Climate Processing.pptx
@@ -2124,7 +2124,7 @@
           </a:ln>
           <a:extLst>
             <a:ext uri="{C572A759-6A51-4108-AA02-DFA0A04FC94B}">
-              <ma14:wrappingTextBoxFlag xmlns="" xmlns:m="http://schemas.openxmlformats.org/officeDocument/2006/math" xmlns:a14="http://schemas.microsoft.com/office/drawing/2010/main" xmlns:ma14="http://schemas.microsoft.com/office/mac/drawingml/2011/main" val="1"/>
+              <ma14:wrappingTextBoxFlag xmlns:ma14="http://schemas.microsoft.com/office/mac/drawingml/2011/main" xmlns:a14="http://schemas.microsoft.com/office/drawing/2010/main" xmlns:m="http://schemas.openxmlformats.org/officeDocument/2006/math" xmlns="" val="1"/>
             </a:ext>
           </a:extLst>
         </p:spPr>
@@ -2163,7 +2163,7 @@
           </a:ln>
           <a:extLst>
             <a:ext uri="{C572A759-6A51-4108-AA02-DFA0A04FC94B}">
-              <ma14:wrappingTextBoxFlag xmlns="" xmlns:m="http://schemas.openxmlformats.org/officeDocument/2006/math" xmlns:a14="http://schemas.microsoft.com/office/drawing/2010/main" xmlns:ma14="http://schemas.microsoft.com/office/mac/drawingml/2011/main" val="1"/>
+              <ma14:wrappingTextBoxFlag xmlns:ma14="http://schemas.microsoft.com/office/mac/drawingml/2011/main" xmlns:a14="http://schemas.microsoft.com/office/drawing/2010/main" xmlns:m="http://schemas.openxmlformats.org/officeDocument/2006/math" xmlns="" val="1"/>
             </a:ext>
           </a:extLst>
         </p:spPr>
@@ -3393,7 +3393,7 @@
           <a:noFill/>
           <a:extLst>
             <a:ext uri="{909E8E84-426E-40dd-AFC4-6F175D3DCCD1}">
-              <a14:hiddenFill xmlns="" xmlns:a14="http://schemas.microsoft.com/office/drawing/2010/main">
+              <a14:hiddenFill xmlns:a14="http://schemas.microsoft.com/office/drawing/2010/main" xmlns="">
                 <a:solidFill>
                   <a:srgbClr val="FFFFFF"/>
                 </a:solidFill>
@@ -7044,8 +7044,20 @@
               </a:spcBef>
             </a:pPr>
             <a:r>
+              <a:rPr lang="en-US" sz="4000"/>
+              <a:t>Define (1) shared </a:t>
+            </a:r>
+            <a:r>
               <a:rPr lang="en-US" sz="4000" dirty="0"/>
-              <a:t>Define shared projection layers and training layers.</a:t>
+              <a:t>projection layers </a:t>
+            </a:r>
+            <a:r>
+              <a:rPr lang="en-US" sz="4000"/>
+              <a:t>and (2) training </a:t>
+            </a:r>
+            <a:r>
+              <a:rPr lang="en-US" sz="4000" dirty="0"/>
+              <a:t>layers.</a:t>
             </a:r>
             <a:endParaRPr sz="4000" dirty="0"/>
           </a:p>
@@ -7076,7 +7088,7 @@
           </a:ln>
           <a:extLst>
             <a:ext uri="{C572A759-6A51-4108-AA02-DFA0A04FC94B}">
-              <ma14:wrappingTextBoxFlag xmlns:ma14="http://schemas.microsoft.com/office/mac/drawingml/2011/main" xmlns:a14="http://schemas.microsoft.com/office/drawing/2010/main" xmlns:m="http://schemas.openxmlformats.org/officeDocument/2006/math" xmlns="" val="1"/>
+              <ma14:wrappingTextBoxFlag xmlns="" xmlns:m="http://schemas.openxmlformats.org/officeDocument/2006/math" xmlns:a14="http://schemas.microsoft.com/office/drawing/2010/main" xmlns:ma14="http://schemas.microsoft.com/office/mac/drawingml/2011/main" val="1"/>
             </a:ext>
           </a:extLst>
         </p:spPr>

</xml_diff>